<commit_message>
made slight tweak to 3rd deck
</commit_message>
<xml_diff>
--- a/gitlab/slides/GitLab.pptx
+++ b/gitlab/slides/GitLab.pptx
@@ -26,9 +26,9 @@
     <p:sldId id="2147472657" r:id="rId17"/>
     <p:sldId id="2147472658" r:id="rId18"/>
     <p:sldId id="2147472659" r:id="rId19"/>
-    <p:sldId id="2147472660" r:id="rId20"/>
-    <p:sldId id="2147472661" r:id="rId21"/>
-    <p:sldId id="2147472662" r:id="rId22"/>
+    <p:sldId id="2147472661" r:id="rId20"/>
+    <p:sldId id="2147472662" r:id="rId21"/>
+    <p:sldId id="2147472663" r:id="rId22"/>
     <p:sldId id="269" r:id="rId23"/>
   </p:sldIdLst>
   <p:sldSz cx="9144000" cy="5143500" type="screen16x9"/>
@@ -2055,7 +2055,624 @@
               <a:buSzPts val="1100"/>
               <a:buNone/>
             </a:pPr>
-            <a:endParaRPr dirty="0"/>
+            <a:r>
+              <a:rPr lang="en-US" dirty="0"/>
+              <a:t>stages:</a:t>
+            </a:r>
+          </a:p>
+          <a:p>
+            <a:pPr marL="158750" lvl="0" indent="0" algn="l" rtl="0">
+              <a:lnSpc>
+                <a:spcPct val="100000"/>
+              </a:lnSpc>
+              <a:spcBef>
+                <a:spcPts val="0"/>
+              </a:spcBef>
+              <a:spcAft>
+                <a:spcPts val="0"/>
+              </a:spcAft>
+              <a:buSzPts val="1100"/>
+              <a:buNone/>
+            </a:pPr>
+            <a:r>
+              <a:rPr lang="en-US" dirty="0"/>
+              <a:t>- build</a:t>
+            </a:r>
+          </a:p>
+          <a:p>
+            <a:pPr marL="158750" lvl="0" indent="0" algn="l" rtl="0">
+              <a:lnSpc>
+                <a:spcPct val="100000"/>
+              </a:lnSpc>
+              <a:spcBef>
+                <a:spcPts val="0"/>
+              </a:spcBef>
+              <a:spcAft>
+                <a:spcPts val="0"/>
+              </a:spcAft>
+              <a:buSzPts val="1100"/>
+              <a:buNone/>
+            </a:pPr>
+            <a:r>
+              <a:rPr lang="en-US" dirty="0"/>
+              <a:t>- test</a:t>
+            </a:r>
+          </a:p>
+          <a:p>
+            <a:pPr marL="158750" lvl="0" indent="0" algn="l" rtl="0">
+              <a:lnSpc>
+                <a:spcPct val="100000"/>
+              </a:lnSpc>
+              <a:spcBef>
+                <a:spcPts val="0"/>
+              </a:spcBef>
+              <a:spcAft>
+                <a:spcPts val="0"/>
+              </a:spcAft>
+              <a:buSzPts val="1100"/>
+              <a:buNone/>
+            </a:pPr>
+            <a:r>
+              <a:rPr lang="en-US" dirty="0"/>
+              <a:t>- </a:t>
+            </a:r>
+            <a:r>
+              <a:rPr lang="en-US" dirty="0" err="1"/>
+              <a:t>devsecops</a:t>
+            </a:r>
+            <a:endParaRPr lang="en-US" dirty="0"/>
+          </a:p>
+          <a:p>
+            <a:pPr marL="158750" lvl="0" indent="0" algn="l" rtl="0">
+              <a:lnSpc>
+                <a:spcPct val="100000"/>
+              </a:lnSpc>
+              <a:spcBef>
+                <a:spcPts val="0"/>
+              </a:spcBef>
+              <a:spcAft>
+                <a:spcPts val="0"/>
+              </a:spcAft>
+              <a:buSzPts val="1100"/>
+              <a:buNone/>
+            </a:pPr>
+            <a:endParaRPr lang="en-US" dirty="0"/>
+          </a:p>
+          <a:p>
+            <a:pPr marL="158750" lvl="0" indent="0" algn="l" rtl="0">
+              <a:lnSpc>
+                <a:spcPct val="100000"/>
+              </a:lnSpc>
+              <a:spcBef>
+                <a:spcPts val="0"/>
+              </a:spcBef>
+              <a:spcAft>
+                <a:spcPts val="0"/>
+              </a:spcAft>
+              <a:buSzPts val="1100"/>
+              <a:buNone/>
+            </a:pPr>
+            <a:r>
+              <a:rPr lang="en-US" dirty="0"/>
+              <a:t>include:</a:t>
+            </a:r>
+          </a:p>
+          <a:p>
+            <a:pPr marL="158750" lvl="0" indent="0" algn="l" rtl="0">
+              <a:lnSpc>
+                <a:spcPct val="100000"/>
+              </a:lnSpc>
+              <a:spcBef>
+                <a:spcPts val="0"/>
+              </a:spcBef>
+              <a:spcAft>
+                <a:spcPts val="0"/>
+              </a:spcAft>
+              <a:buSzPts val="1100"/>
+              <a:buNone/>
+            </a:pPr>
+            <a:r>
+              <a:rPr lang="en-US" dirty="0"/>
+              <a:t>- template: Jobs/Dependency-</a:t>
+            </a:r>
+            <a:r>
+              <a:rPr lang="en-US" dirty="0" err="1"/>
+              <a:t>Scanning.gitlab</a:t>
+            </a:r>
+            <a:r>
+              <a:rPr lang="en-US" dirty="0"/>
+              <a:t>-</a:t>
+            </a:r>
+            <a:r>
+              <a:rPr lang="en-US" dirty="0" err="1"/>
+              <a:t>ci.yml</a:t>
+            </a:r>
+            <a:endParaRPr lang="en-US" dirty="0"/>
+          </a:p>
+          <a:p>
+            <a:pPr marL="158750" lvl="0" indent="0" algn="l" rtl="0">
+              <a:lnSpc>
+                <a:spcPct val="100000"/>
+              </a:lnSpc>
+              <a:spcBef>
+                <a:spcPts val="0"/>
+              </a:spcBef>
+              <a:spcAft>
+                <a:spcPts val="0"/>
+              </a:spcAft>
+              <a:buSzPts val="1100"/>
+              <a:buNone/>
+            </a:pPr>
+            <a:endParaRPr lang="en-US" dirty="0"/>
+          </a:p>
+          <a:p>
+            <a:pPr marL="158750" lvl="0" indent="0" algn="l" rtl="0">
+              <a:lnSpc>
+                <a:spcPct val="100000"/>
+              </a:lnSpc>
+              <a:spcBef>
+                <a:spcPts val="0"/>
+              </a:spcBef>
+              <a:spcAft>
+                <a:spcPts val="0"/>
+              </a:spcAft>
+              <a:buSzPts val="1100"/>
+              <a:buNone/>
+            </a:pPr>
+            <a:r>
+              <a:rPr lang="en-US" dirty="0"/>
+              <a:t># override the dependency scanning job</a:t>
+            </a:r>
+          </a:p>
+          <a:p>
+            <a:pPr marL="158750" lvl="0" indent="0" algn="l" rtl="0">
+              <a:lnSpc>
+                <a:spcPct val="100000"/>
+              </a:lnSpc>
+              <a:spcBef>
+                <a:spcPts val="0"/>
+              </a:spcBef>
+              <a:spcAft>
+                <a:spcPts val="0"/>
+              </a:spcAft>
+              <a:buSzPts val="1100"/>
+              <a:buNone/>
+            </a:pPr>
+            <a:r>
+              <a:rPr lang="en-US" dirty="0" err="1"/>
+              <a:t>gemnasium-dependency_scanning</a:t>
+            </a:r>
+            <a:r>
+              <a:rPr lang="en-US" dirty="0"/>
+              <a:t>:</a:t>
+            </a:r>
+          </a:p>
+          <a:p>
+            <a:pPr marL="158750" lvl="0" indent="0" algn="l" rtl="0">
+              <a:lnSpc>
+                <a:spcPct val="100000"/>
+              </a:lnSpc>
+              <a:spcBef>
+                <a:spcPts val="0"/>
+              </a:spcBef>
+              <a:spcAft>
+                <a:spcPts val="0"/>
+              </a:spcAft>
+              <a:buSzPts val="1100"/>
+              <a:buNone/>
+            </a:pPr>
+            <a:r>
+              <a:rPr lang="en-US" dirty="0"/>
+              <a:t>  tags: [ saas-linux-large-amd64 ]</a:t>
+            </a:r>
+          </a:p>
+          <a:p>
+            <a:pPr marL="158750" lvl="0" indent="0" algn="l" rtl="0">
+              <a:lnSpc>
+                <a:spcPct val="100000"/>
+              </a:lnSpc>
+              <a:spcBef>
+                <a:spcPts val="0"/>
+              </a:spcBef>
+              <a:spcAft>
+                <a:spcPts val="0"/>
+              </a:spcAft>
+              <a:buSzPts val="1100"/>
+              <a:buNone/>
+            </a:pPr>
+            <a:r>
+              <a:rPr lang="en-US" dirty="0"/>
+              <a:t>  rules:</a:t>
+            </a:r>
+          </a:p>
+          <a:p>
+            <a:pPr marL="158750" lvl="0" indent="0" algn="l" rtl="0">
+              <a:lnSpc>
+                <a:spcPct val="100000"/>
+              </a:lnSpc>
+              <a:spcBef>
+                <a:spcPts val="0"/>
+              </a:spcBef>
+              <a:spcAft>
+                <a:spcPts val="0"/>
+              </a:spcAft>
+              <a:buSzPts val="1100"/>
+              <a:buNone/>
+            </a:pPr>
+            <a:r>
+              <a:rPr lang="en-US" dirty="0"/>
+              <a:t>    - if: $CI_COMMIT_BRANCH == "main"</a:t>
+            </a:r>
+          </a:p>
+          <a:p>
+            <a:pPr marL="158750" lvl="0" indent="0" algn="l" rtl="0">
+              <a:lnSpc>
+                <a:spcPct val="100000"/>
+              </a:lnSpc>
+              <a:spcBef>
+                <a:spcPts val="0"/>
+              </a:spcBef>
+              <a:spcAft>
+                <a:spcPts val="0"/>
+              </a:spcAft>
+              <a:buSzPts val="1100"/>
+              <a:buNone/>
+            </a:pPr>
+            <a:r>
+              <a:rPr lang="en-US" dirty="0"/>
+              <a:t>    - if: $CI_MERGE_REQUEST_IID</a:t>
+            </a:r>
+          </a:p>
+          <a:p>
+            <a:pPr marL="158750" lvl="0" indent="0" algn="l" rtl="0">
+              <a:lnSpc>
+                <a:spcPct val="100000"/>
+              </a:lnSpc>
+              <a:spcBef>
+                <a:spcPts val="0"/>
+              </a:spcBef>
+              <a:spcAft>
+                <a:spcPts val="0"/>
+              </a:spcAft>
+              <a:buSzPts val="1100"/>
+              <a:buNone/>
+            </a:pPr>
+            <a:r>
+              <a:rPr lang="en-US" dirty="0"/>
+              <a:t>  artifacts:</a:t>
+            </a:r>
+          </a:p>
+          <a:p>
+            <a:pPr marL="158750" lvl="0" indent="0" algn="l" rtl="0">
+              <a:lnSpc>
+                <a:spcPct val="100000"/>
+              </a:lnSpc>
+              <a:spcBef>
+                <a:spcPts val="0"/>
+              </a:spcBef>
+              <a:spcAft>
+                <a:spcPts val="0"/>
+              </a:spcAft>
+              <a:buSzPts val="1100"/>
+              <a:buNone/>
+            </a:pPr>
+            <a:r>
+              <a:rPr lang="en-US" dirty="0"/>
+              <a:t>    paths:</a:t>
+            </a:r>
+          </a:p>
+          <a:p>
+            <a:pPr marL="158750" lvl="0" indent="0" algn="l" rtl="0">
+              <a:lnSpc>
+                <a:spcPct val="100000"/>
+              </a:lnSpc>
+              <a:spcBef>
+                <a:spcPts val="0"/>
+              </a:spcBef>
+              <a:spcAft>
+                <a:spcPts val="0"/>
+              </a:spcAft>
+              <a:buSzPts val="1100"/>
+              <a:buNone/>
+            </a:pPr>
+            <a:r>
+              <a:rPr lang="en-US" dirty="0"/>
+              <a:t>      - </a:t>
+            </a:r>
+            <a:r>
+              <a:rPr lang="en-US" dirty="0" err="1"/>
+              <a:t>gl</a:t>
+            </a:r>
+            <a:r>
+              <a:rPr lang="en-US" dirty="0"/>
+              <a:t>-dependency-scanning-</a:t>
+            </a:r>
+            <a:r>
+              <a:rPr lang="en-US" dirty="0" err="1"/>
+              <a:t>report.json</a:t>
+            </a:r>
+            <a:endParaRPr lang="en-US" dirty="0"/>
+          </a:p>
+          <a:p>
+            <a:pPr marL="158750" lvl="0" indent="0" algn="l" rtl="0">
+              <a:lnSpc>
+                <a:spcPct val="100000"/>
+              </a:lnSpc>
+              <a:spcBef>
+                <a:spcPts val="0"/>
+              </a:spcBef>
+              <a:spcAft>
+                <a:spcPts val="0"/>
+              </a:spcAft>
+              <a:buSzPts val="1100"/>
+              <a:buNone/>
+            </a:pPr>
+            <a:r>
+              <a:rPr lang="en-US" dirty="0"/>
+              <a:t>    reports:</a:t>
+            </a:r>
+          </a:p>
+          <a:p>
+            <a:pPr marL="158750" lvl="0" indent="0" algn="l" rtl="0">
+              <a:lnSpc>
+                <a:spcPct val="100000"/>
+              </a:lnSpc>
+              <a:spcBef>
+                <a:spcPts val="0"/>
+              </a:spcBef>
+              <a:spcAft>
+                <a:spcPts val="0"/>
+              </a:spcAft>
+              <a:buSzPts val="1100"/>
+              <a:buNone/>
+            </a:pPr>
+            <a:r>
+              <a:rPr lang="en-US" dirty="0"/>
+              <a:t>      </a:t>
+            </a:r>
+            <a:r>
+              <a:rPr lang="en-US" dirty="0" err="1"/>
+              <a:t>dependency_scanning</a:t>
+            </a:r>
+            <a:r>
+              <a:rPr lang="en-US" dirty="0"/>
+              <a:t>: </a:t>
+            </a:r>
+            <a:r>
+              <a:rPr lang="en-US" dirty="0" err="1"/>
+              <a:t>gl</a:t>
+            </a:r>
+            <a:r>
+              <a:rPr lang="en-US" dirty="0"/>
+              <a:t>-dependency-scanning-</a:t>
+            </a:r>
+            <a:r>
+              <a:rPr lang="en-US" dirty="0" err="1"/>
+              <a:t>report.json</a:t>
+            </a:r>
+            <a:endParaRPr lang="en-US" dirty="0"/>
+          </a:p>
+          <a:p>
+            <a:pPr marL="158750" lvl="0" indent="0" algn="l" rtl="0">
+              <a:lnSpc>
+                <a:spcPct val="100000"/>
+              </a:lnSpc>
+              <a:spcBef>
+                <a:spcPts val="0"/>
+              </a:spcBef>
+              <a:spcAft>
+                <a:spcPts val="0"/>
+              </a:spcAft>
+              <a:buSzPts val="1100"/>
+              <a:buNone/>
+            </a:pPr>
+            <a:endParaRPr lang="en-US" dirty="0"/>
+          </a:p>
+          <a:p>
+            <a:pPr marL="158750" lvl="0" indent="0" algn="l" rtl="0">
+              <a:lnSpc>
+                <a:spcPct val="100000"/>
+              </a:lnSpc>
+              <a:spcBef>
+                <a:spcPts val="0"/>
+              </a:spcBef>
+              <a:spcAft>
+                <a:spcPts val="0"/>
+              </a:spcAft>
+              <a:buSzPts val="1100"/>
+              <a:buNone/>
+            </a:pPr>
+            <a:r>
+              <a:rPr lang="en-US" dirty="0" err="1"/>
+              <a:t>security_gate</a:t>
+            </a:r>
+            <a:r>
+              <a:rPr lang="en-US" dirty="0"/>
+              <a:t>:</a:t>
+            </a:r>
+          </a:p>
+          <a:p>
+            <a:pPr marL="158750" lvl="0" indent="0" algn="l" rtl="0">
+              <a:lnSpc>
+                <a:spcPct val="100000"/>
+              </a:lnSpc>
+              <a:spcBef>
+                <a:spcPts val="0"/>
+              </a:spcBef>
+              <a:spcAft>
+                <a:spcPts val="0"/>
+              </a:spcAft>
+              <a:buSzPts val="1100"/>
+              <a:buNone/>
+            </a:pPr>
+            <a:r>
+              <a:rPr lang="en-US" dirty="0"/>
+              <a:t>  stage: </a:t>
+            </a:r>
+            <a:r>
+              <a:rPr lang="en-US" dirty="0" err="1"/>
+              <a:t>devsecops</a:t>
+            </a:r>
+            <a:endParaRPr lang="en-US" dirty="0"/>
+          </a:p>
+          <a:p>
+            <a:pPr marL="158750" lvl="0" indent="0" algn="l" rtl="0">
+              <a:lnSpc>
+                <a:spcPct val="100000"/>
+              </a:lnSpc>
+              <a:spcBef>
+                <a:spcPts val="0"/>
+              </a:spcBef>
+              <a:spcAft>
+                <a:spcPts val="0"/>
+              </a:spcAft>
+              <a:buSzPts val="1100"/>
+              <a:buNone/>
+            </a:pPr>
+            <a:r>
+              <a:rPr lang="en-US" dirty="0"/>
+              <a:t>  script:</a:t>
+            </a:r>
+          </a:p>
+          <a:p>
+            <a:pPr marL="158750" lvl="0" indent="0" algn="l" rtl="0">
+              <a:lnSpc>
+                <a:spcPct val="100000"/>
+              </a:lnSpc>
+              <a:spcBef>
+                <a:spcPts val="0"/>
+              </a:spcBef>
+              <a:spcAft>
+                <a:spcPts val="0"/>
+              </a:spcAft>
+              <a:buSzPts val="1100"/>
+              <a:buNone/>
+            </a:pPr>
+            <a:r>
+              <a:rPr lang="en-US" dirty="0"/>
+              <a:t>    - apt-get update &amp;&amp; apt-get -y install </a:t>
+            </a:r>
+            <a:r>
+              <a:rPr lang="en-US" dirty="0" err="1"/>
+              <a:t>jq</a:t>
+            </a:r>
+            <a:endParaRPr lang="en-US" dirty="0"/>
+          </a:p>
+          <a:p>
+            <a:pPr marL="158750" lvl="0" indent="0" algn="l" rtl="0">
+              <a:lnSpc>
+                <a:spcPct val="100000"/>
+              </a:lnSpc>
+              <a:spcBef>
+                <a:spcPts val="0"/>
+              </a:spcBef>
+              <a:spcAft>
+                <a:spcPts val="0"/>
+              </a:spcAft>
+              <a:buSzPts val="1100"/>
+              <a:buNone/>
+            </a:pPr>
+            <a:r>
+              <a:rPr lang="en-US" dirty="0"/>
+              <a:t>    - cat $CI_PROJECT_DIR/</a:t>
+            </a:r>
+            <a:r>
+              <a:rPr lang="en-US" dirty="0" err="1"/>
+              <a:t>gl</a:t>
+            </a:r>
+            <a:r>
+              <a:rPr lang="en-US" dirty="0"/>
+              <a:t>-dependency-scanning-</a:t>
+            </a:r>
+            <a:r>
+              <a:rPr lang="en-US" dirty="0" err="1"/>
+              <a:t>report.json</a:t>
+            </a:r>
+            <a:r>
+              <a:rPr lang="en-US" dirty="0"/>
+              <a:t> | </a:t>
+            </a:r>
+            <a:r>
+              <a:rPr lang="en-US" dirty="0" err="1"/>
+              <a:t>jq</a:t>
+            </a:r>
+            <a:r>
+              <a:rPr lang="en-US" dirty="0"/>
+              <a:t> '.vulnerabilities[] | select(.severity == "High" or .severity == "Critical" or .severity == "Unknown")' | grep . &amp;&amp; exit 1 || exit 0</a:t>
+            </a:r>
+          </a:p>
+          <a:p>
+            <a:pPr marL="158750" lvl="0" indent="0" algn="l" rtl="0">
+              <a:lnSpc>
+                <a:spcPct val="100000"/>
+              </a:lnSpc>
+              <a:spcBef>
+                <a:spcPts val="0"/>
+              </a:spcBef>
+              <a:spcAft>
+                <a:spcPts val="0"/>
+              </a:spcAft>
+              <a:buSzPts val="1100"/>
+              <a:buNone/>
+            </a:pPr>
+            <a:r>
+              <a:rPr lang="en-US" dirty="0"/>
+              <a:t>  rules:</a:t>
+            </a:r>
+          </a:p>
+          <a:p>
+            <a:pPr marL="158750" lvl="0" indent="0" algn="l" rtl="0">
+              <a:lnSpc>
+                <a:spcPct val="100000"/>
+              </a:lnSpc>
+              <a:spcBef>
+                <a:spcPts val="0"/>
+              </a:spcBef>
+              <a:spcAft>
+                <a:spcPts val="0"/>
+              </a:spcAft>
+              <a:buSzPts val="1100"/>
+              <a:buNone/>
+            </a:pPr>
+            <a:r>
+              <a:rPr lang="en-US" dirty="0"/>
+              <a:t>    - if: $CI_COMMIT_BRANCH == "main"</a:t>
+            </a:r>
+          </a:p>
+          <a:p>
+            <a:pPr marL="158750" lvl="0" indent="0" algn="l" rtl="0">
+              <a:lnSpc>
+                <a:spcPct val="100000"/>
+              </a:lnSpc>
+              <a:spcBef>
+                <a:spcPts val="0"/>
+              </a:spcBef>
+              <a:spcAft>
+                <a:spcPts val="0"/>
+              </a:spcAft>
+              <a:buSzPts val="1100"/>
+              <a:buNone/>
+            </a:pPr>
+            <a:r>
+              <a:rPr lang="en-US" dirty="0"/>
+              <a:t>    - if: $CI_MERGE_REQUEST_IID</a:t>
+            </a:r>
+          </a:p>
+          <a:p>
+            <a:pPr marL="158750" lvl="0" indent="0" algn="l" rtl="0">
+              <a:lnSpc>
+                <a:spcPct val="100000"/>
+              </a:lnSpc>
+              <a:spcBef>
+                <a:spcPts val="0"/>
+              </a:spcBef>
+              <a:spcAft>
+                <a:spcPts val="0"/>
+              </a:spcAft>
+              <a:buSzPts val="1100"/>
+              <a:buNone/>
+            </a:pPr>
+            <a:endParaRPr lang="en-US" dirty="0"/>
           </a:p>
         </p:txBody>
       </p:sp>
@@ -2073,365 +2690,6 @@
 </file>
 
 <file path=ppt/notesSlides/notesSlide19.xml><?xml version="1.0" encoding="utf-8"?>
-<p:notes xmlns:a="http://schemas.openxmlformats.org/drawingml/2006/main" xmlns:r="http://schemas.openxmlformats.org/officeDocument/2006/relationships" xmlns:p="http://schemas.openxmlformats.org/presentationml/2006/main" showMasterSp="0" showMasterPhAnim="0">
-  <p:cSld>
-    <p:spTree>
-      <p:nvGrpSpPr>
-        <p:cNvPr id="1" name="Shape 1289">
-          <a:extLst>
-            <a:ext uri="{FF2B5EF4-FFF2-40B4-BE49-F238E27FC236}">
-              <a16:creationId xmlns:a16="http://schemas.microsoft.com/office/drawing/2014/main" id="{04FA588D-A925-6A9F-142B-D1721D2BE717}"/>
-            </a:ext>
-          </a:extLst>
-        </p:cNvPr>
-        <p:cNvGrpSpPr/>
-        <p:nvPr/>
-      </p:nvGrpSpPr>
-      <p:grpSpPr>
-        <a:xfrm>
-          <a:off x="0" y="0"/>
-          <a:ext cx="0" cy="0"/>
-          <a:chOff x="0" y="0"/>
-          <a:chExt cx="0" cy="0"/>
-        </a:xfrm>
-      </p:grpSpPr>
-      <p:sp>
-        <p:nvSpPr>
-          <p:cNvPr id="1290" name="Google Shape;1290;p112:notes">
-            <a:extLst>
-              <a:ext uri="{FF2B5EF4-FFF2-40B4-BE49-F238E27FC236}">
-                <a16:creationId xmlns:a16="http://schemas.microsoft.com/office/drawing/2014/main" id="{E3E291FD-8ED5-4AC4-CAE1-5EE7050E7026}"/>
-              </a:ext>
-            </a:extLst>
-          </p:cNvPr>
-          <p:cNvSpPr>
-            <a:spLocks noGrp="1" noRot="1" noChangeAspect="1"/>
-          </p:cNvSpPr>
-          <p:nvPr>
-            <p:ph type="sldImg" idx="2"/>
-          </p:nvPr>
-        </p:nvSpPr>
-        <p:spPr>
-          <a:xfrm>
-            <a:off x="381000" y="685800"/>
-            <a:ext cx="6096000" cy="3429000"/>
-          </a:xfrm>
-          <a:custGeom>
-            <a:avLst/>
-            <a:gdLst/>
-            <a:ahLst/>
-            <a:cxnLst/>
-            <a:rect l="l" t="t" r="r" b="b"/>
-            <a:pathLst>
-              <a:path w="120000" h="120000" extrusionOk="0">
-                <a:moveTo>
-                  <a:pt x="0" y="0"/>
-                </a:moveTo>
-                <a:lnTo>
-                  <a:pt x="120000" y="0"/>
-                </a:lnTo>
-                <a:lnTo>
-                  <a:pt x="120000" y="120000"/>
-                </a:lnTo>
-                <a:lnTo>
-                  <a:pt x="0" y="120000"/>
-                </a:lnTo>
-                <a:close/>
-              </a:path>
-            </a:pathLst>
-          </a:custGeom>
-          <a:noFill/>
-          <a:ln w="9525" cap="flat" cmpd="sng">
-            <a:solidFill>
-              <a:srgbClr val="000000"/>
-            </a:solidFill>
-            <a:prstDash val="solid"/>
-            <a:round/>
-            <a:headEnd type="none" w="sm" len="sm"/>
-            <a:tailEnd type="none" w="sm" len="sm"/>
-          </a:ln>
-        </p:spPr>
-      </p:sp>
-      <p:sp>
-        <p:nvSpPr>
-          <p:cNvPr id="1291" name="Google Shape;1291;p112:notes">
-            <a:extLst>
-              <a:ext uri="{FF2B5EF4-FFF2-40B4-BE49-F238E27FC236}">
-                <a16:creationId xmlns:a16="http://schemas.microsoft.com/office/drawing/2014/main" id="{8DEB163F-1355-ED86-BB14-E2763721AE3F}"/>
-              </a:ext>
-            </a:extLst>
-          </p:cNvPr>
-          <p:cNvSpPr txBox="1">
-            <a:spLocks noGrp="1"/>
-          </p:cNvSpPr>
-          <p:nvPr>
-            <p:ph type="body" idx="1"/>
-          </p:nvPr>
-        </p:nvSpPr>
-        <p:spPr>
-          <a:xfrm>
-            <a:off x="685800" y="4343400"/>
-            <a:ext cx="5486400" cy="4114800"/>
-          </a:xfrm>
-          <a:prstGeom prst="rect">
-            <a:avLst/>
-          </a:prstGeom>
-          <a:noFill/>
-          <a:ln>
-            <a:noFill/>
-          </a:ln>
-        </p:spPr>
-        <p:txBody>
-          <a:bodyPr spcFirstLastPara="1" wrap="square" lIns="91425" tIns="91425" rIns="91425" bIns="91425" anchor="t" anchorCtr="0">
-            <a:noAutofit/>
-          </a:bodyPr>
-          <a:lstStyle/>
-          <a:p>
-            <a:pPr marL="158750" lvl="0" indent="0" algn="l" rtl="0">
-              <a:lnSpc>
-                <a:spcPct val="100000"/>
-              </a:lnSpc>
-              <a:spcBef>
-                <a:spcPts val="0"/>
-              </a:spcBef>
-              <a:spcAft>
-                <a:spcPts val="0"/>
-              </a:spcAft>
-              <a:buSzPts val="1100"/>
-              <a:buNone/>
-            </a:pPr>
-            <a:endParaRPr dirty="0"/>
-          </a:p>
-        </p:txBody>
-      </p:sp>
-    </p:spTree>
-    <p:extLst>
-      <p:ext uri="{BB962C8B-B14F-4D97-AF65-F5344CB8AC3E}">
-        <p14:creationId xmlns:p14="http://schemas.microsoft.com/office/powerpoint/2010/main" val="1789472613"/>
-      </p:ext>
-    </p:extLst>
-  </p:cSld>
-  <p:clrMapOvr>
-    <a:masterClrMapping/>
-  </p:clrMapOvr>
-</p:notes>
-</file>
-
-<file path=ppt/notesSlides/notesSlide2.xml><?xml version="1.0" encoding="utf-8"?>
-<p:notes xmlns:a="http://schemas.openxmlformats.org/drawingml/2006/main" xmlns:r="http://schemas.openxmlformats.org/officeDocument/2006/relationships" xmlns:p="http://schemas.openxmlformats.org/presentationml/2006/main" showMasterSp="0" showMasterPhAnim="0">
-  <p:cSld>
-    <p:spTree>
-      <p:nvGrpSpPr>
-        <p:cNvPr id="1" name="Shape 229"/>
-        <p:cNvGrpSpPr/>
-        <p:nvPr/>
-      </p:nvGrpSpPr>
-      <p:grpSpPr>
-        <a:xfrm>
-          <a:off x="0" y="0"/>
-          <a:ext cx="0" cy="0"/>
-          <a:chOff x="0" y="0"/>
-          <a:chExt cx="0" cy="0"/>
-        </a:xfrm>
-      </p:grpSpPr>
-      <p:sp>
-        <p:nvSpPr>
-          <p:cNvPr id="230" name="Google Shape;230;p2:notes"/>
-          <p:cNvSpPr>
-            <a:spLocks noGrp="1" noRot="1" noChangeAspect="1"/>
-          </p:cNvSpPr>
-          <p:nvPr>
-            <p:ph type="sldImg" idx="2"/>
-          </p:nvPr>
-        </p:nvSpPr>
-        <p:spPr>
-          <a:xfrm>
-            <a:off x="381000" y="685800"/>
-            <a:ext cx="6096000" cy="3429000"/>
-          </a:xfrm>
-          <a:custGeom>
-            <a:avLst/>
-            <a:gdLst/>
-            <a:ahLst/>
-            <a:cxnLst/>
-            <a:rect l="l" t="t" r="r" b="b"/>
-            <a:pathLst>
-              <a:path w="120000" h="120000" extrusionOk="0">
-                <a:moveTo>
-                  <a:pt x="0" y="0"/>
-                </a:moveTo>
-                <a:lnTo>
-                  <a:pt x="120000" y="0"/>
-                </a:lnTo>
-                <a:lnTo>
-                  <a:pt x="120000" y="120000"/>
-                </a:lnTo>
-                <a:lnTo>
-                  <a:pt x="0" y="120000"/>
-                </a:lnTo>
-                <a:close/>
-              </a:path>
-            </a:pathLst>
-          </a:custGeom>
-          <a:noFill/>
-          <a:ln w="9525" cap="flat" cmpd="sng">
-            <a:solidFill>
-              <a:srgbClr val="000000"/>
-            </a:solidFill>
-            <a:prstDash val="solid"/>
-            <a:round/>
-            <a:headEnd type="none" w="sm" len="sm"/>
-            <a:tailEnd type="none" w="sm" len="sm"/>
-          </a:ln>
-        </p:spPr>
-      </p:sp>
-      <p:sp>
-        <p:nvSpPr>
-          <p:cNvPr id="231" name="Google Shape;231;p2:notes"/>
-          <p:cNvSpPr txBox="1">
-            <a:spLocks noGrp="1"/>
-          </p:cNvSpPr>
-          <p:nvPr>
-            <p:ph type="body" idx="1"/>
-          </p:nvPr>
-        </p:nvSpPr>
-        <p:spPr>
-          <a:xfrm>
-            <a:off x="685800" y="4343400"/>
-            <a:ext cx="5486400" cy="4114800"/>
-          </a:xfrm>
-          <a:prstGeom prst="rect">
-            <a:avLst/>
-          </a:prstGeom>
-          <a:noFill/>
-          <a:ln>
-            <a:noFill/>
-          </a:ln>
-        </p:spPr>
-        <p:txBody>
-          <a:bodyPr spcFirstLastPara="1" wrap="square" lIns="91425" tIns="91425" rIns="91425" bIns="91425" anchor="t" anchorCtr="0">
-            <a:noAutofit/>
-          </a:bodyPr>
-          <a:lstStyle/>
-          <a:p>
-            <a:pPr marL="0" lvl="0" indent="0" algn="l" rtl="0">
-              <a:lnSpc>
-                <a:spcPct val="100000"/>
-              </a:lnSpc>
-              <a:spcBef>
-                <a:spcPts val="0"/>
-              </a:spcBef>
-              <a:spcAft>
-                <a:spcPts val="0"/>
-              </a:spcAft>
-              <a:buSzPts val="1100"/>
-              <a:buNone/>
-            </a:pPr>
-            <a:r>
-              <a:rPr lang="en-US" sz="1200" dirty="0">
-                <a:solidFill>
-                  <a:srgbClr val="404040"/>
-                </a:solidFill>
-                <a:latin typeface="Calibri"/>
-                <a:ea typeface="Calibri"/>
-                <a:cs typeface="Calibri"/>
-                <a:sym typeface="Calibri"/>
-              </a:rPr>
-              <a:t>After introducing self, have students introduce themselves:</a:t>
-            </a:r>
-          </a:p>
-          <a:p>
-            <a:pPr marL="228600" lvl="0" indent="-228600" algn="l" rtl="0">
-              <a:lnSpc>
-                <a:spcPct val="100000"/>
-              </a:lnSpc>
-              <a:spcBef>
-                <a:spcPts val="0"/>
-              </a:spcBef>
-              <a:spcAft>
-                <a:spcPts val="0"/>
-              </a:spcAft>
-              <a:buSzPts val="1100"/>
-              <a:buAutoNum type="arabicPeriod"/>
-            </a:pPr>
-            <a:r>
-              <a:rPr lang="en-US" sz="1200" dirty="0">
-                <a:solidFill>
-                  <a:srgbClr val="404040"/>
-                </a:solidFill>
-                <a:latin typeface="Calibri"/>
-                <a:ea typeface="Calibri"/>
-                <a:cs typeface="Calibri"/>
-                <a:sym typeface="Calibri"/>
-              </a:rPr>
-              <a:t>Name?</a:t>
-            </a:r>
-          </a:p>
-          <a:p>
-            <a:pPr marL="228600" lvl="0" indent="-228600" algn="l" rtl="0">
-              <a:lnSpc>
-                <a:spcPct val="100000"/>
-              </a:lnSpc>
-              <a:spcBef>
-                <a:spcPts val="0"/>
-              </a:spcBef>
-              <a:spcAft>
-                <a:spcPts val="0"/>
-              </a:spcAft>
-              <a:buSzPts val="1100"/>
-              <a:buAutoNum type="arabicPeriod"/>
-            </a:pPr>
-            <a:r>
-              <a:rPr lang="en-US" sz="1200" dirty="0">
-                <a:solidFill>
-                  <a:srgbClr val="404040"/>
-                </a:solidFill>
-                <a:latin typeface="Calibri"/>
-                <a:ea typeface="Calibri"/>
-                <a:cs typeface="Calibri"/>
-                <a:sym typeface="Calibri"/>
-              </a:rPr>
-              <a:t>How long with the company?</a:t>
-            </a:r>
-          </a:p>
-          <a:p>
-            <a:pPr marL="228600" lvl="0" indent="-228600" algn="l" rtl="0">
-              <a:lnSpc>
-                <a:spcPct val="100000"/>
-              </a:lnSpc>
-              <a:spcBef>
-                <a:spcPts val="0"/>
-              </a:spcBef>
-              <a:spcAft>
-                <a:spcPts val="0"/>
-              </a:spcAft>
-              <a:buSzPts val="1100"/>
-              <a:buAutoNum type="arabicPeriod"/>
-            </a:pPr>
-            <a:r>
-              <a:rPr lang="en-US" sz="1200" dirty="0">
-                <a:solidFill>
-                  <a:srgbClr val="404040"/>
-                </a:solidFill>
-                <a:latin typeface="Calibri"/>
-                <a:ea typeface="Calibri"/>
-                <a:cs typeface="Calibri"/>
-                <a:sym typeface="Calibri"/>
-              </a:rPr>
-              <a:t>What are you hoping to come away from this training having gained in terms of knowledge and/or information that you can take back with you to your teams and your day-to-day role?</a:t>
-            </a:r>
-          </a:p>
-        </p:txBody>
-      </p:sp>
-    </p:spTree>
-  </p:cSld>
-  <p:clrMapOvr>
-    <a:masterClrMapping/>
-  </p:clrMapOvr>
-</p:notes>
-</file>
-
-<file path=ppt/notesSlides/notesSlide20.xml><?xml version="1.0" encoding="utf-8"?>
 <p:notes xmlns:a="http://schemas.openxmlformats.org/drawingml/2006/main" xmlns:r="http://schemas.openxmlformats.org/officeDocument/2006/relationships" xmlns:p="http://schemas.openxmlformats.org/presentationml/2006/main" showMasterSp="0" showMasterPhAnim="0">
   <p:cSld>
     <p:spTree>
@@ -2576,7 +2834,221 @@
 </p:notes>
 </file>
 
-<file path=ppt/notesSlides/notesSlide21.xml><?xml version="1.0" encoding="utf-8"?>
+<file path=ppt/notesSlides/notesSlide2.xml><?xml version="1.0" encoding="utf-8"?>
+<p:notes xmlns:a="http://schemas.openxmlformats.org/drawingml/2006/main" xmlns:r="http://schemas.openxmlformats.org/officeDocument/2006/relationships" xmlns:p="http://schemas.openxmlformats.org/presentationml/2006/main" showMasterSp="0" showMasterPhAnim="0">
+  <p:cSld>
+    <p:spTree>
+      <p:nvGrpSpPr>
+        <p:cNvPr id="1" name="Shape 229"/>
+        <p:cNvGrpSpPr/>
+        <p:nvPr/>
+      </p:nvGrpSpPr>
+      <p:grpSpPr>
+        <a:xfrm>
+          <a:off x="0" y="0"/>
+          <a:ext cx="0" cy="0"/>
+          <a:chOff x="0" y="0"/>
+          <a:chExt cx="0" cy="0"/>
+        </a:xfrm>
+      </p:grpSpPr>
+      <p:sp>
+        <p:nvSpPr>
+          <p:cNvPr id="230" name="Google Shape;230;p2:notes"/>
+          <p:cNvSpPr>
+            <a:spLocks noGrp="1" noRot="1" noChangeAspect="1"/>
+          </p:cNvSpPr>
+          <p:nvPr>
+            <p:ph type="sldImg" idx="2"/>
+          </p:nvPr>
+        </p:nvSpPr>
+        <p:spPr>
+          <a:xfrm>
+            <a:off x="381000" y="685800"/>
+            <a:ext cx="6096000" cy="3429000"/>
+          </a:xfrm>
+          <a:custGeom>
+            <a:avLst/>
+            <a:gdLst/>
+            <a:ahLst/>
+            <a:cxnLst/>
+            <a:rect l="l" t="t" r="r" b="b"/>
+            <a:pathLst>
+              <a:path w="120000" h="120000" extrusionOk="0">
+                <a:moveTo>
+                  <a:pt x="0" y="0"/>
+                </a:moveTo>
+                <a:lnTo>
+                  <a:pt x="120000" y="0"/>
+                </a:lnTo>
+                <a:lnTo>
+                  <a:pt x="120000" y="120000"/>
+                </a:lnTo>
+                <a:lnTo>
+                  <a:pt x="0" y="120000"/>
+                </a:lnTo>
+                <a:close/>
+              </a:path>
+            </a:pathLst>
+          </a:custGeom>
+          <a:noFill/>
+          <a:ln w="9525" cap="flat" cmpd="sng">
+            <a:solidFill>
+              <a:srgbClr val="000000"/>
+            </a:solidFill>
+            <a:prstDash val="solid"/>
+            <a:round/>
+            <a:headEnd type="none" w="sm" len="sm"/>
+            <a:tailEnd type="none" w="sm" len="sm"/>
+          </a:ln>
+        </p:spPr>
+      </p:sp>
+      <p:sp>
+        <p:nvSpPr>
+          <p:cNvPr id="231" name="Google Shape;231;p2:notes"/>
+          <p:cNvSpPr txBox="1">
+            <a:spLocks noGrp="1"/>
+          </p:cNvSpPr>
+          <p:nvPr>
+            <p:ph type="body" idx="1"/>
+          </p:nvPr>
+        </p:nvSpPr>
+        <p:spPr>
+          <a:xfrm>
+            <a:off x="685800" y="4343400"/>
+            <a:ext cx="5486400" cy="4114800"/>
+          </a:xfrm>
+          <a:prstGeom prst="rect">
+            <a:avLst/>
+          </a:prstGeom>
+          <a:noFill/>
+          <a:ln>
+            <a:noFill/>
+          </a:ln>
+        </p:spPr>
+        <p:txBody>
+          <a:bodyPr spcFirstLastPara="1" wrap="square" lIns="91425" tIns="91425" rIns="91425" bIns="91425" anchor="t" anchorCtr="0">
+            <a:noAutofit/>
+          </a:bodyPr>
+          <a:lstStyle/>
+          <a:p>
+            <a:pPr marL="0" lvl="0" indent="0" algn="l" rtl="0">
+              <a:lnSpc>
+                <a:spcPct val="100000"/>
+              </a:lnSpc>
+              <a:spcBef>
+                <a:spcPts val="0"/>
+              </a:spcBef>
+              <a:spcAft>
+                <a:spcPts val="0"/>
+              </a:spcAft>
+              <a:buSzPts val="1100"/>
+              <a:buNone/>
+            </a:pPr>
+            <a:r>
+              <a:rPr lang="en-US" sz="1200" dirty="0">
+                <a:solidFill>
+                  <a:srgbClr val="404040"/>
+                </a:solidFill>
+                <a:latin typeface="Calibri"/>
+                <a:ea typeface="Calibri"/>
+                <a:cs typeface="Calibri"/>
+                <a:sym typeface="Calibri"/>
+              </a:rPr>
+              <a:t>After introducing self, have students introduce themselves:</a:t>
+            </a:r>
+          </a:p>
+          <a:p>
+            <a:pPr marL="228600" lvl="0" indent="-228600" algn="l" rtl="0">
+              <a:lnSpc>
+                <a:spcPct val="100000"/>
+              </a:lnSpc>
+              <a:spcBef>
+                <a:spcPts val="0"/>
+              </a:spcBef>
+              <a:spcAft>
+                <a:spcPts val="0"/>
+              </a:spcAft>
+              <a:buSzPts val="1100"/>
+              <a:buAutoNum type="arabicPeriod"/>
+            </a:pPr>
+            <a:r>
+              <a:rPr lang="en-US" sz="1200" dirty="0">
+                <a:solidFill>
+                  <a:srgbClr val="404040"/>
+                </a:solidFill>
+                <a:latin typeface="Calibri"/>
+                <a:ea typeface="Calibri"/>
+                <a:cs typeface="Calibri"/>
+                <a:sym typeface="Calibri"/>
+              </a:rPr>
+              <a:t>Name?</a:t>
+            </a:r>
+          </a:p>
+          <a:p>
+            <a:pPr marL="228600" lvl="0" indent="-228600" algn="l" rtl="0">
+              <a:lnSpc>
+                <a:spcPct val="100000"/>
+              </a:lnSpc>
+              <a:spcBef>
+                <a:spcPts val="0"/>
+              </a:spcBef>
+              <a:spcAft>
+                <a:spcPts val="0"/>
+              </a:spcAft>
+              <a:buSzPts val="1100"/>
+              <a:buAutoNum type="arabicPeriod"/>
+            </a:pPr>
+            <a:r>
+              <a:rPr lang="en-US" sz="1200" dirty="0">
+                <a:solidFill>
+                  <a:srgbClr val="404040"/>
+                </a:solidFill>
+                <a:latin typeface="Calibri"/>
+                <a:ea typeface="Calibri"/>
+                <a:cs typeface="Calibri"/>
+                <a:sym typeface="Calibri"/>
+              </a:rPr>
+              <a:t>How long with the company?</a:t>
+            </a:r>
+          </a:p>
+          <a:p>
+            <a:pPr marL="228600" lvl="0" indent="-228600" algn="l" rtl="0">
+              <a:lnSpc>
+                <a:spcPct val="100000"/>
+              </a:lnSpc>
+              <a:spcBef>
+                <a:spcPts val="0"/>
+              </a:spcBef>
+              <a:spcAft>
+                <a:spcPts val="0"/>
+              </a:spcAft>
+              <a:buSzPts val="1100"/>
+              <a:buAutoNum type="arabicPeriod"/>
+            </a:pPr>
+            <a:r>
+              <a:rPr lang="en-US" sz="1200" dirty="0">
+                <a:solidFill>
+                  <a:srgbClr val="404040"/>
+                </a:solidFill>
+                <a:latin typeface="Calibri"/>
+                <a:ea typeface="Calibri"/>
+                <a:cs typeface="Calibri"/>
+                <a:sym typeface="Calibri"/>
+              </a:rPr>
+              <a:t>What are you hoping to come away from this training having gained in terms of knowledge and/or information that you can take back with you to your teams and your day-to-day role?</a:t>
+            </a:r>
+          </a:p>
+        </p:txBody>
+      </p:sp>
+    </p:spTree>
+  </p:cSld>
+  <p:clrMapOvr>
+    <a:masterClrMapping/>
+  </p:clrMapOvr>
+</p:notes>
+</file>
+
+<file path=ppt/notesSlides/notesSlide20.xml><?xml version="1.0" encoding="utf-8"?>
 <p:notes xmlns:a="http://schemas.openxmlformats.org/drawingml/2006/main" xmlns:r="http://schemas.openxmlformats.org/officeDocument/2006/relationships" xmlns:p="http://schemas.openxmlformats.org/presentationml/2006/main" showMasterSp="0" showMasterPhAnim="0">
   <p:cSld>
     <p:spTree>
@@ -2712,6 +3184,151 @@
     <p:extLst>
       <p:ext uri="{BB962C8B-B14F-4D97-AF65-F5344CB8AC3E}">
         <p14:creationId xmlns:p14="http://schemas.microsoft.com/office/powerpoint/2010/main" val="3159020"/>
+      </p:ext>
+    </p:extLst>
+  </p:cSld>
+  <p:clrMapOvr>
+    <a:masterClrMapping/>
+  </p:clrMapOvr>
+</p:notes>
+</file>
+
+<file path=ppt/notesSlides/notesSlide21.xml><?xml version="1.0" encoding="utf-8"?>
+<p:notes xmlns:a="http://schemas.openxmlformats.org/drawingml/2006/main" xmlns:r="http://schemas.openxmlformats.org/officeDocument/2006/relationships" xmlns:p="http://schemas.openxmlformats.org/presentationml/2006/main" showMasterSp="0" showMasterPhAnim="0">
+  <p:cSld>
+    <p:spTree>
+      <p:nvGrpSpPr>
+        <p:cNvPr id="1" name="Shape 1289">
+          <a:extLst>
+            <a:ext uri="{FF2B5EF4-FFF2-40B4-BE49-F238E27FC236}">
+              <a16:creationId xmlns:a16="http://schemas.microsoft.com/office/drawing/2014/main" id="{DCA32EE1-40AE-0D3C-FD2C-1B1F5B5C40C0}"/>
+            </a:ext>
+          </a:extLst>
+        </p:cNvPr>
+        <p:cNvGrpSpPr/>
+        <p:nvPr/>
+      </p:nvGrpSpPr>
+      <p:grpSpPr>
+        <a:xfrm>
+          <a:off x="0" y="0"/>
+          <a:ext cx="0" cy="0"/>
+          <a:chOff x="0" y="0"/>
+          <a:chExt cx="0" cy="0"/>
+        </a:xfrm>
+      </p:grpSpPr>
+      <p:sp>
+        <p:nvSpPr>
+          <p:cNvPr id="1290" name="Google Shape;1290;p112:notes">
+            <a:extLst>
+              <a:ext uri="{FF2B5EF4-FFF2-40B4-BE49-F238E27FC236}">
+                <a16:creationId xmlns:a16="http://schemas.microsoft.com/office/drawing/2014/main" id="{06E4CE39-26B0-82F8-EE8B-C09F862F7CD3}"/>
+              </a:ext>
+            </a:extLst>
+          </p:cNvPr>
+          <p:cNvSpPr>
+            <a:spLocks noGrp="1" noRot="1" noChangeAspect="1"/>
+          </p:cNvSpPr>
+          <p:nvPr>
+            <p:ph type="sldImg" idx="2"/>
+          </p:nvPr>
+        </p:nvSpPr>
+        <p:spPr>
+          <a:xfrm>
+            <a:off x="381000" y="685800"/>
+            <a:ext cx="6096000" cy="3429000"/>
+          </a:xfrm>
+          <a:custGeom>
+            <a:avLst/>
+            <a:gdLst/>
+            <a:ahLst/>
+            <a:cxnLst/>
+            <a:rect l="l" t="t" r="r" b="b"/>
+            <a:pathLst>
+              <a:path w="120000" h="120000" extrusionOk="0">
+                <a:moveTo>
+                  <a:pt x="0" y="0"/>
+                </a:moveTo>
+                <a:lnTo>
+                  <a:pt x="120000" y="0"/>
+                </a:lnTo>
+                <a:lnTo>
+                  <a:pt x="120000" y="120000"/>
+                </a:lnTo>
+                <a:lnTo>
+                  <a:pt x="0" y="120000"/>
+                </a:lnTo>
+                <a:close/>
+              </a:path>
+            </a:pathLst>
+          </a:custGeom>
+          <a:noFill/>
+          <a:ln w="9525" cap="flat" cmpd="sng">
+            <a:solidFill>
+              <a:srgbClr val="000000"/>
+            </a:solidFill>
+            <a:prstDash val="solid"/>
+            <a:round/>
+            <a:headEnd type="none" w="sm" len="sm"/>
+            <a:tailEnd type="none" w="sm" len="sm"/>
+          </a:ln>
+        </p:spPr>
+      </p:sp>
+      <p:sp>
+        <p:nvSpPr>
+          <p:cNvPr id="1291" name="Google Shape;1291;p112:notes">
+            <a:extLst>
+              <a:ext uri="{FF2B5EF4-FFF2-40B4-BE49-F238E27FC236}">
+                <a16:creationId xmlns:a16="http://schemas.microsoft.com/office/drawing/2014/main" id="{97B369EF-891F-6B66-426C-FB32B3645685}"/>
+              </a:ext>
+            </a:extLst>
+          </p:cNvPr>
+          <p:cNvSpPr txBox="1">
+            <a:spLocks noGrp="1"/>
+          </p:cNvSpPr>
+          <p:nvPr>
+            <p:ph type="body" idx="1"/>
+          </p:nvPr>
+        </p:nvSpPr>
+        <p:spPr>
+          <a:xfrm>
+            <a:off x="685800" y="4343400"/>
+            <a:ext cx="5486400" cy="4114800"/>
+          </a:xfrm>
+          <a:prstGeom prst="rect">
+            <a:avLst/>
+          </a:prstGeom>
+          <a:noFill/>
+          <a:ln>
+            <a:noFill/>
+          </a:ln>
+        </p:spPr>
+        <p:txBody>
+          <a:bodyPr spcFirstLastPara="1" wrap="square" lIns="91425" tIns="91425" rIns="91425" bIns="91425" anchor="t" anchorCtr="0">
+            <a:noAutofit/>
+          </a:bodyPr>
+          <a:lstStyle/>
+          <a:p>
+            <a:pPr marL="158750" lvl="0" indent="0" algn="l" rtl="0">
+              <a:lnSpc>
+                <a:spcPct val="100000"/>
+              </a:lnSpc>
+              <a:spcBef>
+                <a:spcPts val="0"/>
+              </a:spcBef>
+              <a:spcAft>
+                <a:spcPts val="0"/>
+              </a:spcAft>
+              <a:buSzPts val="1100"/>
+              <a:buNone/>
+            </a:pPr>
+            <a:endParaRPr dirty="0"/>
+          </a:p>
+        </p:txBody>
+      </p:sp>
+    </p:spTree>
+    <p:extLst>
+      <p:ext uri="{BB962C8B-B14F-4D97-AF65-F5344CB8AC3E}">
+        <p14:creationId xmlns:p14="http://schemas.microsoft.com/office/powerpoint/2010/main" val="857192003"/>
       </p:ext>
     </p:extLst>
   </p:cSld>
@@ -14913,7 +15530,7 @@
             <a:fld id="{1D8BD707-D9CF-40AE-B4C6-C98DA3205C09}" type="datetimeFigureOut">
               <a:rPr lang="en-US" smtClean="0"/>
               <a:pPr/>
-              <a:t>1/29/2025</a:t>
+              <a:t>1/31/2025</a:t>
             </a:fld>
             <a:endParaRPr lang="en-US"/>
           </a:p>
@@ -21594,7 +22211,7 @@
         <p:spPr>
           <a:xfrm>
             <a:off x="3942735" y="2495059"/>
-            <a:ext cx="5201265" cy="246181"/>
+            <a:ext cx="5201265" cy="553957"/>
           </a:xfrm>
           <a:prstGeom prst="rect">
             <a:avLst/>
@@ -21631,11 +22248,31 @@
               </a:rPr>
               <a:t>https://docs.gitlab.com/ee/user/packages/pypi_repository/auto_publish_tutorial.html</a:t>
             </a:r>
-            <a:endParaRPr lang="en-US" sz="1000" dirty="0">
-              <a:solidFill>
-                <a:srgbClr val="D4D4D4"/>
-              </a:solidFill>
-            </a:endParaRPr>
+            <a:r>
+              <a:rPr lang="en-US" sz="1000" dirty="0">
+                <a:solidFill>
+                  <a:srgbClr val="D4D4D4"/>
+                </a:solidFill>
+              </a:rPr>
+              <a:t>. For the Python app, you can use the app &amp; tests at </a:t>
+            </a:r>
+            <a:r>
+              <a:rPr lang="en-US" sz="1000" dirty="0">
+                <a:solidFill>
+                  <a:srgbClr val="D4D4D4"/>
+                </a:solidFill>
+                <a:hlinkClick r:id="rId4"/>
+              </a:rPr>
+              <a:t>https://github.com/KernelGamut32/python-jenkins</a:t>
+            </a:r>
+            <a:r>
+              <a:rPr lang="en-US" sz="1000" dirty="0">
+                <a:solidFill>
+                  <a:srgbClr val="D4D4D4"/>
+                </a:solidFill>
+              </a:rPr>
+              <a:t>.</a:t>
+            </a:r>
           </a:p>
         </p:txBody>
       </p:sp>
@@ -22540,7 +23177,7 @@
         <p:cNvPr id="1" name="Shape 1292">
           <a:extLst>
             <a:ext uri="{FF2B5EF4-FFF2-40B4-BE49-F238E27FC236}">
-              <a16:creationId xmlns:a16="http://schemas.microsoft.com/office/drawing/2014/main" id="{A3B21A23-8066-AEA7-A672-4A59BF470215}"/>
+              <a16:creationId xmlns:a16="http://schemas.microsoft.com/office/drawing/2014/main" id="{C0F9A049-DA8E-1DAA-9560-9F4BC5AE049F}"/>
             </a:ext>
           </a:extLst>
         </p:cNvPr>
@@ -22560,7 +23197,7 @@
           <p:cNvPr id="1293" name="Google Shape;1293;p112">
             <a:extLst>
               <a:ext uri="{FF2B5EF4-FFF2-40B4-BE49-F238E27FC236}">
-                <a16:creationId xmlns:a16="http://schemas.microsoft.com/office/drawing/2014/main" id="{25AF4826-8B6F-3D15-38E0-A14FB7058D43}"/>
+                <a16:creationId xmlns:a16="http://schemas.microsoft.com/office/drawing/2014/main" id="{7BB5A1F9-7E10-21C3-2453-EC6D78F30E3A}"/>
               </a:ext>
             </a:extLst>
           </p:cNvPr>
@@ -22619,7 +23256,7 @@
           <p:cNvPr id="1294" name="Google Shape;1294;p112">
             <a:extLst>
               <a:ext uri="{FF2B5EF4-FFF2-40B4-BE49-F238E27FC236}">
-                <a16:creationId xmlns:a16="http://schemas.microsoft.com/office/drawing/2014/main" id="{831ADE7B-6788-13D2-4954-27D13DD13113}"/>
+                <a16:creationId xmlns:a16="http://schemas.microsoft.com/office/drawing/2014/main" id="{FA3FCC83-6329-97BF-365B-15EB82F438D7}"/>
               </a:ext>
             </a:extLst>
           </p:cNvPr>
@@ -22664,7 +23301,7 @@
             </a:pPr>
             <a:r>
               <a:rPr lang="en-US" dirty="0"/>
-              <a:t>Merge Request Approval Policy</a:t>
+              <a:t>Docker Container Scanning</a:t>
             </a:r>
           </a:p>
           <a:p>
@@ -22690,7 +23327,7 @@
           <p:cNvPr id="1295" name="Google Shape;1295;p112">
             <a:extLst>
               <a:ext uri="{FF2B5EF4-FFF2-40B4-BE49-F238E27FC236}">
-                <a16:creationId xmlns:a16="http://schemas.microsoft.com/office/drawing/2014/main" id="{56F0686A-0CD9-5C9A-367F-9AB8D07629B4}"/>
+                <a16:creationId xmlns:a16="http://schemas.microsoft.com/office/drawing/2014/main" id="{B687CD8C-02F8-4A13-E286-61D8AC84A3DD}"/>
               </a:ext>
             </a:extLst>
           </p:cNvPr>
@@ -22746,7 +23383,7 @@
           <p:cNvPr id="1296" name="Google Shape;1296;p112">
             <a:extLst>
               <a:ext uri="{FF2B5EF4-FFF2-40B4-BE49-F238E27FC236}">
-                <a16:creationId xmlns:a16="http://schemas.microsoft.com/office/drawing/2014/main" id="{5096546C-D815-58B1-0297-1E11BFFDAA1A}"/>
+                <a16:creationId xmlns:a16="http://schemas.microsoft.com/office/drawing/2014/main" id="{93257B9F-5DB8-6F94-B103-00DBE6C1FF91}"/>
               </a:ext>
             </a:extLst>
           </p:cNvPr>
@@ -22791,7 +23428,7 @@
                 </a:solidFill>
                 <a:hlinkClick r:id="rId3"/>
               </a:rPr>
-              <a:t>https://docs.gitlab.com/ee/tutorials/scan_result_policy/index.html</a:t>
+              <a:t>https://docs.gitlab.com/ee/tutorials/container_scanning/index.html</a:t>
             </a:r>
             <a:endParaRPr lang="en-US" sz="1000" dirty="0">
               <a:solidFill>
@@ -22804,7 +23441,7 @@
     </p:spTree>
     <p:extLst>
       <p:ext uri="{BB962C8B-B14F-4D97-AF65-F5344CB8AC3E}">
-        <p14:creationId xmlns:p14="http://schemas.microsoft.com/office/powerpoint/2010/main" val="348853218"/>
+        <p14:creationId xmlns:p14="http://schemas.microsoft.com/office/powerpoint/2010/main" val="264363935"/>
       </p:ext>
     </p:extLst>
   </p:cSld>
@@ -23364,288 +24001,6 @@
         <p:cNvPr id="1" name="Shape 1292">
           <a:extLst>
             <a:ext uri="{FF2B5EF4-FFF2-40B4-BE49-F238E27FC236}">
-              <a16:creationId xmlns:a16="http://schemas.microsoft.com/office/drawing/2014/main" id="{C0F9A049-DA8E-1DAA-9560-9F4BC5AE049F}"/>
-            </a:ext>
-          </a:extLst>
-        </p:cNvPr>
-        <p:cNvGrpSpPr/>
-        <p:nvPr/>
-      </p:nvGrpSpPr>
-      <p:grpSpPr>
-        <a:xfrm>
-          <a:off x="0" y="0"/>
-          <a:ext cx="0" cy="0"/>
-          <a:chOff x="0" y="0"/>
-          <a:chExt cx="0" cy="0"/>
-        </a:xfrm>
-      </p:grpSpPr>
-      <p:sp>
-        <p:nvSpPr>
-          <p:cNvPr id="1293" name="Google Shape;1293;p112">
-            <a:extLst>
-              <a:ext uri="{FF2B5EF4-FFF2-40B4-BE49-F238E27FC236}">
-                <a16:creationId xmlns:a16="http://schemas.microsoft.com/office/drawing/2014/main" id="{7BB5A1F9-7E10-21C3-2453-EC6D78F30E3A}"/>
-              </a:ext>
-            </a:extLst>
-          </p:cNvPr>
-          <p:cNvSpPr txBox="1">
-            <a:spLocks noGrp="1"/>
-          </p:cNvSpPr>
-          <p:nvPr>
-            <p:ph type="title"/>
-          </p:nvPr>
-        </p:nvSpPr>
-        <p:spPr>
-          <a:xfrm>
-            <a:off x="256575" y="2094950"/>
-            <a:ext cx="2382000" cy="523200"/>
-          </a:xfrm>
-          <a:prstGeom prst="rect">
-            <a:avLst/>
-          </a:prstGeom>
-          <a:noFill/>
-          <a:ln>
-            <a:noFill/>
-          </a:ln>
-        </p:spPr>
-        <p:txBody>
-          <a:bodyPr spcFirstLastPara="1" wrap="square" lIns="45700" tIns="45700" rIns="45700" bIns="45700" anchor="b" anchorCtr="0">
-            <a:noAutofit/>
-          </a:bodyPr>
-          <a:lstStyle/>
-          <a:p>
-            <a:pPr marL="0" lvl="0" indent="0" algn="r" rtl="0">
-              <a:lnSpc>
-                <a:spcPct val="90000"/>
-              </a:lnSpc>
-              <a:spcBef>
-                <a:spcPts val="0"/>
-              </a:spcBef>
-              <a:spcAft>
-                <a:spcPts val="0"/>
-              </a:spcAft>
-              <a:buClr>
-                <a:schemeClr val="lt1"/>
-              </a:buClr>
-              <a:buSzPts val="1900"/>
-              <a:buNone/>
-            </a:pPr>
-            <a:r>
-              <a:rPr lang="en-US"/>
-              <a:t>LAB:</a:t>
-            </a:r>
-            <a:endParaRPr/>
-          </a:p>
-        </p:txBody>
-      </p:sp>
-      <p:sp>
-        <p:nvSpPr>
-          <p:cNvPr id="1294" name="Google Shape;1294;p112">
-            <a:extLst>
-              <a:ext uri="{FF2B5EF4-FFF2-40B4-BE49-F238E27FC236}">
-                <a16:creationId xmlns:a16="http://schemas.microsoft.com/office/drawing/2014/main" id="{FA3FCC83-6329-97BF-365B-15EB82F438D7}"/>
-              </a:ext>
-            </a:extLst>
-          </p:cNvPr>
-          <p:cNvSpPr txBox="1">
-            <a:spLocks noGrp="1"/>
-          </p:cNvSpPr>
-          <p:nvPr>
-            <p:ph type="subTitle" idx="2"/>
-          </p:nvPr>
-        </p:nvSpPr>
-        <p:spPr>
-          <a:xfrm>
-            <a:off x="-285134" y="2607625"/>
-            <a:ext cx="2923660" cy="523200"/>
-          </a:xfrm>
-          <a:prstGeom prst="rect">
-            <a:avLst/>
-          </a:prstGeom>
-          <a:noFill/>
-          <a:ln>
-            <a:noFill/>
-          </a:ln>
-        </p:spPr>
-        <p:txBody>
-          <a:bodyPr spcFirstLastPara="1" wrap="square" lIns="91400" tIns="91400" rIns="91400" bIns="91400" anchor="t" anchorCtr="0">
-            <a:noAutofit/>
-          </a:bodyPr>
-          <a:lstStyle/>
-          <a:p>
-            <a:pPr marL="457200" lvl="0" indent="-228600" algn="r" rtl="0">
-              <a:lnSpc>
-                <a:spcPct val="100000"/>
-              </a:lnSpc>
-              <a:spcBef>
-                <a:spcPts val="0"/>
-              </a:spcBef>
-              <a:spcAft>
-                <a:spcPts val="0"/>
-              </a:spcAft>
-              <a:buSzPts val="2700"/>
-              <a:buNone/>
-            </a:pPr>
-            <a:r>
-              <a:rPr lang="en-US" dirty="0"/>
-              <a:t>Docker Container Scanning</a:t>
-            </a:r>
-          </a:p>
-          <a:p>
-            <a:pPr marL="457200" lvl="0" indent="-228600" algn="r" rtl="0">
-              <a:lnSpc>
-                <a:spcPct val="100000"/>
-              </a:lnSpc>
-              <a:spcBef>
-                <a:spcPts val="0"/>
-              </a:spcBef>
-              <a:spcAft>
-                <a:spcPts val="0"/>
-              </a:spcAft>
-              <a:buSzPts val="2700"/>
-              <a:buNone/>
-            </a:pPr>
-            <a:endParaRPr dirty="0"/>
-          </a:p>
-        </p:txBody>
-      </p:sp>
-      <p:sp>
-        <p:nvSpPr>
-          <p:cNvPr id="1295" name="Google Shape;1295;p112">
-            <a:extLst>
-              <a:ext uri="{FF2B5EF4-FFF2-40B4-BE49-F238E27FC236}">
-                <a16:creationId xmlns:a16="http://schemas.microsoft.com/office/drawing/2014/main" id="{B687CD8C-02F8-4A13-E286-61D8AC84A3DD}"/>
-              </a:ext>
-            </a:extLst>
-          </p:cNvPr>
-          <p:cNvSpPr txBox="1">
-            <a:spLocks noGrp="1"/>
-          </p:cNvSpPr>
-          <p:nvPr>
-            <p:ph type="sldNum" idx="12"/>
-          </p:nvPr>
-        </p:nvSpPr>
-        <p:spPr>
-          <a:xfrm>
-            <a:off x="8556784" y="4749851"/>
-            <a:ext cx="548700" cy="393600"/>
-          </a:xfrm>
-          <a:prstGeom prst="rect">
-            <a:avLst/>
-          </a:prstGeom>
-          <a:noFill/>
-          <a:ln>
-            <a:noFill/>
-          </a:ln>
-        </p:spPr>
-        <p:txBody>
-          <a:bodyPr spcFirstLastPara="1" wrap="square" lIns="91425" tIns="91425" rIns="91425" bIns="91425" anchor="t" anchorCtr="0">
-            <a:noAutofit/>
-          </a:bodyPr>
-          <a:lstStyle/>
-          <a:p>
-            <a:pPr marL="0" lvl="0" indent="0" algn="r" rtl="0">
-              <a:lnSpc>
-                <a:spcPct val="100000"/>
-              </a:lnSpc>
-              <a:spcBef>
-                <a:spcPts val="0"/>
-              </a:spcBef>
-              <a:spcAft>
-                <a:spcPts val="0"/>
-              </a:spcAft>
-              <a:buSzPts val="1300"/>
-              <a:buNone/>
-            </a:pPr>
-            <a:fld id="{00000000-1234-1234-1234-123412341234}" type="slidenum">
-              <a:rPr lang="en-US"/>
-              <a:t>20</a:t>
-            </a:fld>
-            <a:endParaRPr/>
-          </a:p>
-        </p:txBody>
-      </p:sp>
-      <p:sp>
-        <p:nvSpPr>
-          <p:cNvPr id="1296" name="Google Shape;1296;p112">
-            <a:extLst>
-              <a:ext uri="{FF2B5EF4-FFF2-40B4-BE49-F238E27FC236}">
-                <a16:creationId xmlns:a16="http://schemas.microsoft.com/office/drawing/2014/main" id="{93257B9F-5DB8-6F94-B103-00DBE6C1FF91}"/>
-              </a:ext>
-            </a:extLst>
-          </p:cNvPr>
-          <p:cNvSpPr txBox="1"/>
-          <p:nvPr/>
-        </p:nvSpPr>
-        <p:spPr>
-          <a:xfrm>
-            <a:off x="4572000" y="2495059"/>
-            <a:ext cx="4572000" cy="246181"/>
-          </a:xfrm>
-          <a:prstGeom prst="rect">
-            <a:avLst/>
-          </a:prstGeom>
-          <a:noFill/>
-          <a:ln>
-            <a:noFill/>
-          </a:ln>
-        </p:spPr>
-        <p:txBody>
-          <a:bodyPr spcFirstLastPara="1" wrap="square" lIns="91425" tIns="45700" rIns="91425" bIns="45700" anchor="t" anchorCtr="0">
-            <a:spAutoFit/>
-          </a:bodyPr>
-          <a:lstStyle/>
-          <a:p>
-            <a:pPr marL="0" marR="0" lvl="0" indent="0" algn="l" rtl="0">
-              <a:lnSpc>
-                <a:spcPct val="100000"/>
-              </a:lnSpc>
-              <a:spcBef>
-                <a:spcPts val="0"/>
-              </a:spcBef>
-              <a:spcAft>
-                <a:spcPts val="0"/>
-              </a:spcAft>
-              <a:buNone/>
-            </a:pPr>
-            <a:r>
-              <a:rPr lang="en-US" sz="1000" dirty="0">
-                <a:solidFill>
-                  <a:srgbClr val="D4D4D4"/>
-                </a:solidFill>
-                <a:hlinkClick r:id="rId3"/>
-              </a:rPr>
-              <a:t>https://docs.gitlab.com/ee/tutorials/container_scanning/index.html</a:t>
-            </a:r>
-            <a:endParaRPr lang="en-US" sz="1000" dirty="0">
-              <a:solidFill>
-                <a:srgbClr val="D4D4D4"/>
-              </a:solidFill>
-            </a:endParaRPr>
-          </a:p>
-        </p:txBody>
-      </p:sp>
-    </p:spTree>
-    <p:extLst>
-      <p:ext uri="{BB962C8B-B14F-4D97-AF65-F5344CB8AC3E}">
-        <p14:creationId xmlns:p14="http://schemas.microsoft.com/office/powerpoint/2010/main" val="264363935"/>
-      </p:ext>
-    </p:extLst>
-  </p:cSld>
-  <p:clrMapOvr>
-    <a:masterClrMapping/>
-  </p:clrMapOvr>
-</p:sld>
-</file>
-
-<file path=ppt/slides/slide21.xml><?xml version="1.0" encoding="utf-8"?>
-<p:sld xmlns:a="http://schemas.openxmlformats.org/drawingml/2006/main" xmlns:r="http://schemas.openxmlformats.org/officeDocument/2006/relationships" xmlns:p="http://schemas.openxmlformats.org/presentationml/2006/main">
-  <p:cSld>
-    <p:spTree>
-      <p:nvGrpSpPr>
-        <p:cNvPr id="1" name="Shape 1292">
-          <a:extLst>
-            <a:ext uri="{FF2B5EF4-FFF2-40B4-BE49-F238E27FC236}">
               <a16:creationId xmlns:a16="http://schemas.microsoft.com/office/drawing/2014/main" id="{862CFE9A-8B85-865C-67FE-83DAF2E039C7}"/>
             </a:ext>
           </a:extLst>
@@ -23841,7 +24196,7 @@
             </a:pPr>
             <a:fld id="{00000000-1234-1234-1234-123412341234}" type="slidenum">
               <a:rPr lang="en-US"/>
-              <a:t>21</a:t>
+              <a:t>20</a:t>
             </a:fld>
             <a:endParaRPr/>
           </a:p>
@@ -23897,7 +24252,7 @@
                 </a:solidFill>
                 <a:hlinkClick r:id="rId3"/>
               </a:rPr>
-              <a:t>https://university.gitlab.com/learn/course/hands-on-labs-gitlab-with-git-essentials/main/hands-on-challenge-gitlab-with-git-essentials</a:t>
+              <a:t>https://university.gitlab.com/learn/course/hands-on-lab-security-essentials/main/hands-on-challenge-gitlab-security-essentials</a:t>
             </a:r>
             <a:endParaRPr lang="en-US" sz="1000" dirty="0">
               <a:solidFill>
@@ -23911,6 +24266,298 @@
     <p:extLst>
       <p:ext uri="{BB962C8B-B14F-4D97-AF65-F5344CB8AC3E}">
         <p14:creationId xmlns:p14="http://schemas.microsoft.com/office/powerpoint/2010/main" val="3876104701"/>
+      </p:ext>
+    </p:extLst>
+  </p:cSld>
+  <p:clrMapOvr>
+    <a:masterClrMapping/>
+  </p:clrMapOvr>
+</p:sld>
+</file>
+
+<file path=ppt/slides/slide21.xml><?xml version="1.0" encoding="utf-8"?>
+<p:sld xmlns:a="http://schemas.openxmlformats.org/drawingml/2006/main" xmlns:r="http://schemas.openxmlformats.org/officeDocument/2006/relationships" xmlns:p="http://schemas.openxmlformats.org/presentationml/2006/main">
+  <p:cSld>
+    <p:spTree>
+      <p:nvGrpSpPr>
+        <p:cNvPr id="1" name="Shape 1292">
+          <a:extLst>
+            <a:ext uri="{FF2B5EF4-FFF2-40B4-BE49-F238E27FC236}">
+              <a16:creationId xmlns:a16="http://schemas.microsoft.com/office/drawing/2014/main" id="{84565F25-EEB0-AC47-0C58-E9415BEE90A8}"/>
+            </a:ext>
+          </a:extLst>
+        </p:cNvPr>
+        <p:cNvGrpSpPr/>
+        <p:nvPr/>
+      </p:nvGrpSpPr>
+      <p:grpSpPr>
+        <a:xfrm>
+          <a:off x="0" y="0"/>
+          <a:ext cx="0" cy="0"/>
+          <a:chOff x="0" y="0"/>
+          <a:chExt cx="0" cy="0"/>
+        </a:xfrm>
+      </p:grpSpPr>
+      <p:sp>
+        <p:nvSpPr>
+          <p:cNvPr id="1293" name="Google Shape;1293;p112">
+            <a:extLst>
+              <a:ext uri="{FF2B5EF4-FFF2-40B4-BE49-F238E27FC236}">
+                <a16:creationId xmlns:a16="http://schemas.microsoft.com/office/drawing/2014/main" id="{EF683AF4-BF01-BCB4-8E01-82FBB58CA0F2}"/>
+              </a:ext>
+            </a:extLst>
+          </p:cNvPr>
+          <p:cNvSpPr txBox="1">
+            <a:spLocks noGrp="1"/>
+          </p:cNvSpPr>
+          <p:nvPr>
+            <p:ph type="title"/>
+          </p:nvPr>
+        </p:nvSpPr>
+        <p:spPr>
+          <a:xfrm>
+            <a:off x="256575" y="2094950"/>
+            <a:ext cx="2382000" cy="523200"/>
+          </a:xfrm>
+          <a:prstGeom prst="rect">
+            <a:avLst/>
+          </a:prstGeom>
+          <a:noFill/>
+          <a:ln>
+            <a:noFill/>
+          </a:ln>
+        </p:spPr>
+        <p:txBody>
+          <a:bodyPr spcFirstLastPara="1" wrap="square" lIns="45700" tIns="45700" rIns="45700" bIns="45700" anchor="b" anchorCtr="0">
+            <a:noAutofit/>
+          </a:bodyPr>
+          <a:lstStyle/>
+          <a:p>
+            <a:pPr marL="0" lvl="0" indent="0" algn="r" rtl="0">
+              <a:lnSpc>
+                <a:spcPct val="90000"/>
+              </a:lnSpc>
+              <a:spcBef>
+                <a:spcPts val="0"/>
+              </a:spcBef>
+              <a:spcAft>
+                <a:spcPts val="0"/>
+              </a:spcAft>
+              <a:buClr>
+                <a:schemeClr val="lt1"/>
+              </a:buClr>
+              <a:buSzPts val="1900"/>
+              <a:buNone/>
+            </a:pPr>
+            <a:r>
+              <a:rPr lang="en-US"/>
+              <a:t>LAB:</a:t>
+            </a:r>
+            <a:endParaRPr/>
+          </a:p>
+        </p:txBody>
+      </p:sp>
+      <p:sp>
+        <p:nvSpPr>
+          <p:cNvPr id="1294" name="Google Shape;1294;p112">
+            <a:extLst>
+              <a:ext uri="{FF2B5EF4-FFF2-40B4-BE49-F238E27FC236}">
+                <a16:creationId xmlns:a16="http://schemas.microsoft.com/office/drawing/2014/main" id="{F3A5220C-0EC4-CE28-5847-F970F6AACD40}"/>
+              </a:ext>
+            </a:extLst>
+          </p:cNvPr>
+          <p:cNvSpPr txBox="1">
+            <a:spLocks noGrp="1"/>
+          </p:cNvSpPr>
+          <p:nvPr>
+            <p:ph type="subTitle" idx="2"/>
+          </p:nvPr>
+        </p:nvSpPr>
+        <p:spPr>
+          <a:xfrm>
+            <a:off x="-285134" y="2607625"/>
+            <a:ext cx="2923660" cy="523200"/>
+          </a:xfrm>
+          <a:prstGeom prst="rect">
+            <a:avLst/>
+          </a:prstGeom>
+          <a:noFill/>
+          <a:ln>
+            <a:noFill/>
+          </a:ln>
+        </p:spPr>
+        <p:txBody>
+          <a:bodyPr spcFirstLastPara="1" wrap="square" lIns="91400" tIns="91400" rIns="91400" bIns="91400" anchor="t" anchorCtr="0">
+            <a:noAutofit/>
+          </a:bodyPr>
+          <a:lstStyle/>
+          <a:p>
+            <a:pPr marL="457200" lvl="0" indent="-228600" algn="r" rtl="0">
+              <a:lnSpc>
+                <a:spcPct val="100000"/>
+              </a:lnSpc>
+              <a:spcBef>
+                <a:spcPts val="0"/>
+              </a:spcBef>
+              <a:spcAft>
+                <a:spcPts val="0"/>
+              </a:spcAft>
+              <a:buSzPts val="2700"/>
+              <a:buNone/>
+            </a:pPr>
+            <a:r>
+              <a:rPr lang="en-US" dirty="0"/>
+              <a:t>Security End-to-End</a:t>
+            </a:r>
+          </a:p>
+          <a:p>
+            <a:pPr marL="457200" lvl="0" indent="-228600" algn="r" rtl="0">
+              <a:lnSpc>
+                <a:spcPct val="100000"/>
+              </a:lnSpc>
+              <a:spcBef>
+                <a:spcPts val="0"/>
+              </a:spcBef>
+              <a:spcAft>
+                <a:spcPts val="0"/>
+              </a:spcAft>
+              <a:buSzPts val="2700"/>
+              <a:buNone/>
+            </a:pPr>
+            <a:endParaRPr dirty="0"/>
+          </a:p>
+        </p:txBody>
+      </p:sp>
+      <p:sp>
+        <p:nvSpPr>
+          <p:cNvPr id="1295" name="Google Shape;1295;p112">
+            <a:extLst>
+              <a:ext uri="{FF2B5EF4-FFF2-40B4-BE49-F238E27FC236}">
+                <a16:creationId xmlns:a16="http://schemas.microsoft.com/office/drawing/2014/main" id="{D2C65716-0151-205C-AE32-D321F3022F3F}"/>
+              </a:ext>
+            </a:extLst>
+          </p:cNvPr>
+          <p:cNvSpPr txBox="1">
+            <a:spLocks noGrp="1"/>
+          </p:cNvSpPr>
+          <p:nvPr>
+            <p:ph type="sldNum" idx="12"/>
+          </p:nvPr>
+        </p:nvSpPr>
+        <p:spPr>
+          <a:xfrm>
+            <a:off x="8556784" y="4749851"/>
+            <a:ext cx="548700" cy="393600"/>
+          </a:xfrm>
+          <a:prstGeom prst="rect">
+            <a:avLst/>
+          </a:prstGeom>
+          <a:noFill/>
+          <a:ln>
+            <a:noFill/>
+          </a:ln>
+        </p:spPr>
+        <p:txBody>
+          <a:bodyPr spcFirstLastPara="1" wrap="square" lIns="91425" tIns="91425" rIns="91425" bIns="91425" anchor="t" anchorCtr="0">
+            <a:noAutofit/>
+          </a:bodyPr>
+          <a:lstStyle/>
+          <a:p>
+            <a:pPr marL="0" lvl="0" indent="0" algn="r" rtl="0">
+              <a:lnSpc>
+                <a:spcPct val="100000"/>
+              </a:lnSpc>
+              <a:spcBef>
+                <a:spcPts val="0"/>
+              </a:spcBef>
+              <a:spcAft>
+                <a:spcPts val="0"/>
+              </a:spcAft>
+              <a:buSzPts val="1300"/>
+              <a:buNone/>
+            </a:pPr>
+            <a:fld id="{00000000-1234-1234-1234-123412341234}" type="slidenum">
+              <a:rPr lang="en-US"/>
+              <a:t>21</a:t>
+            </a:fld>
+            <a:endParaRPr/>
+          </a:p>
+        </p:txBody>
+      </p:sp>
+      <p:sp>
+        <p:nvSpPr>
+          <p:cNvPr id="1296" name="Google Shape;1296;p112">
+            <a:extLst>
+              <a:ext uri="{FF2B5EF4-FFF2-40B4-BE49-F238E27FC236}">
+                <a16:creationId xmlns:a16="http://schemas.microsoft.com/office/drawing/2014/main" id="{C454DEC4-325F-7183-F586-EB647A5AC6B6}"/>
+              </a:ext>
+            </a:extLst>
+          </p:cNvPr>
+          <p:cNvSpPr txBox="1"/>
+          <p:nvPr/>
+        </p:nvSpPr>
+        <p:spPr>
+          <a:xfrm>
+            <a:off x="4219427" y="2475395"/>
+            <a:ext cx="4572000" cy="707846"/>
+          </a:xfrm>
+          <a:prstGeom prst="rect">
+            <a:avLst/>
+          </a:prstGeom>
+          <a:noFill/>
+          <a:ln>
+            <a:noFill/>
+          </a:ln>
+        </p:spPr>
+        <p:txBody>
+          <a:bodyPr spcFirstLastPara="1" wrap="square" lIns="91425" tIns="45700" rIns="91425" bIns="45700" anchor="t" anchorCtr="0">
+            <a:spAutoFit/>
+          </a:bodyPr>
+          <a:lstStyle/>
+          <a:p>
+            <a:pPr marL="0" marR="0" lvl="0" indent="0" algn="l" rtl="0">
+              <a:lnSpc>
+                <a:spcPct val="100000"/>
+              </a:lnSpc>
+              <a:spcBef>
+                <a:spcPts val="0"/>
+              </a:spcBef>
+              <a:spcAft>
+                <a:spcPts val="0"/>
+              </a:spcAft>
+              <a:buNone/>
+            </a:pPr>
+            <a:r>
+              <a:rPr lang="en-US" sz="1000" dirty="0">
+                <a:solidFill>
+                  <a:srgbClr val="D4D4D4"/>
+                </a:solidFill>
+              </a:rPr>
+              <a:t>Update your </a:t>
+            </a:r>
+            <a:r>
+              <a:rPr lang="en-US" sz="1000" dirty="0" err="1">
+                <a:solidFill>
+                  <a:srgbClr val="D4D4D4"/>
+                </a:solidFill>
+              </a:rPr>
+              <a:t>Docusaurus</a:t>
+            </a:r>
+            <a:r>
+              <a:rPr lang="en-US" sz="1000" dirty="0">
+                <a:solidFill>
+                  <a:srgbClr val="D4D4D4"/>
+                </a:solidFill>
+              </a:rPr>
+              <a:t> solution to include the various concepts we’ve been learning – add dependency scanning, SAST, DAST, additional stages, etc. to build out a more full-featured pipeline. Address any High or Critical vulnerabilities uncovered.</a:t>
+            </a:r>
+          </a:p>
+        </p:txBody>
+      </p:sp>
+    </p:spTree>
+    <p:extLst>
+      <p:ext uri="{BB962C8B-B14F-4D97-AF65-F5344CB8AC3E}">
+        <p14:creationId xmlns:p14="http://schemas.microsoft.com/office/powerpoint/2010/main" val="3318081443"/>
       </p:ext>
     </p:extLst>
   </p:cSld>

</xml_diff>